<commit_message>
Added map to presentation
</commit_message>
<xml_diff>
--- a/Presentation/Kingdom of Souls.pptx
+++ b/Presentation/Kingdom of Souls.pptx
@@ -14,6 +14,7 @@
     <p:sldId id="263" r:id="rId8"/>
     <p:sldId id="258" r:id="rId9"/>
     <p:sldId id="265" r:id="rId10"/>
+    <p:sldId id="266" r:id="rId11"/>
   </p:sldIdLst>
   <p:sldSz cx="12192000" cy="6858000"/>
   <p:notesSz cx="6858000" cy="9144000"/>
@@ -305,7 +306,7 @@
           <a:p>
             <a:fld id="{9379C374-18C6-4E53-9ACF-4A8973656D85}" type="datetimeFigureOut">
               <a:rPr lang="de-AT" smtClean="0"/>
-              <a:t>23.06.2022</a:t>
+              <a:t>24.06.2022</a:t>
             </a:fld>
             <a:endParaRPr lang="de-AT"/>
           </a:p>
@@ -603,7 +604,7 @@
           <a:p>
             <a:fld id="{9379C374-18C6-4E53-9ACF-4A8973656D85}" type="datetimeFigureOut">
               <a:rPr lang="de-AT" smtClean="0"/>
-              <a:t>23.06.2022</a:t>
+              <a:t>24.06.2022</a:t>
             </a:fld>
             <a:endParaRPr lang="de-AT"/>
           </a:p>
@@ -795,7 +796,7 @@
           <a:p>
             <a:fld id="{9379C374-18C6-4E53-9ACF-4A8973656D85}" type="datetimeFigureOut">
               <a:rPr lang="de-AT" smtClean="0"/>
-              <a:t>23.06.2022</a:t>
+              <a:t>24.06.2022</a:t>
             </a:fld>
             <a:endParaRPr lang="de-AT"/>
           </a:p>
@@ -1056,7 +1057,7 @@
           <a:p>
             <a:fld id="{9379C374-18C6-4E53-9ACF-4A8973656D85}" type="datetimeFigureOut">
               <a:rPr lang="de-AT" smtClean="0"/>
-              <a:t>23.06.2022</a:t>
+              <a:t>24.06.2022</a:t>
             </a:fld>
             <a:endParaRPr lang="de-AT"/>
           </a:p>
@@ -1480,7 +1481,7 @@
           <a:p>
             <a:fld id="{9379C374-18C6-4E53-9ACF-4A8973656D85}" type="datetimeFigureOut">
               <a:rPr lang="de-AT" smtClean="0"/>
-              <a:t>23.06.2022</a:t>
+              <a:t>24.06.2022</a:t>
             </a:fld>
             <a:endParaRPr lang="de-AT"/>
           </a:p>
@@ -2017,7 +2018,7 @@
           <a:p>
             <a:fld id="{9379C374-18C6-4E53-9ACF-4A8973656D85}" type="datetimeFigureOut">
               <a:rPr lang="de-AT" smtClean="0"/>
-              <a:t>23.06.2022</a:t>
+              <a:t>24.06.2022</a:t>
             </a:fld>
             <a:endParaRPr lang="de-AT"/>
           </a:p>
@@ -2881,7 +2882,7 @@
           <a:p>
             <a:fld id="{9379C374-18C6-4E53-9ACF-4A8973656D85}" type="datetimeFigureOut">
               <a:rPr lang="de-AT" smtClean="0"/>
-              <a:t>23.06.2022</a:t>
+              <a:t>24.06.2022</a:t>
             </a:fld>
             <a:endParaRPr lang="de-AT"/>
           </a:p>
@@ -3051,7 +3052,7 @@
           <a:p>
             <a:fld id="{9379C374-18C6-4E53-9ACF-4A8973656D85}" type="datetimeFigureOut">
               <a:rPr lang="de-AT" smtClean="0"/>
-              <a:t>23.06.2022</a:t>
+              <a:t>24.06.2022</a:t>
             </a:fld>
             <a:endParaRPr lang="de-AT"/>
           </a:p>
@@ -3235,7 +3236,7 @@
           <a:p>
             <a:fld id="{9379C374-18C6-4E53-9ACF-4A8973656D85}" type="datetimeFigureOut">
               <a:rPr lang="de-AT" smtClean="0"/>
-              <a:t>23.06.2022</a:t>
+              <a:t>24.06.2022</a:t>
             </a:fld>
             <a:endParaRPr lang="de-AT"/>
           </a:p>
@@ -3405,7 +3406,7 @@
           <a:p>
             <a:fld id="{9379C374-18C6-4E53-9ACF-4A8973656D85}" type="datetimeFigureOut">
               <a:rPr lang="de-AT" smtClean="0"/>
-              <a:t>23.06.2022</a:t>
+              <a:t>24.06.2022</a:t>
             </a:fld>
             <a:endParaRPr lang="de-AT"/>
           </a:p>
@@ -3649,7 +3650,7 @@
           <a:p>
             <a:fld id="{9379C374-18C6-4E53-9ACF-4A8973656D85}" type="datetimeFigureOut">
               <a:rPr lang="de-AT" smtClean="0"/>
-              <a:t>23.06.2022</a:t>
+              <a:t>24.06.2022</a:t>
             </a:fld>
             <a:endParaRPr lang="de-AT"/>
           </a:p>
@@ -3885,7 +3886,7 @@
           <a:p>
             <a:fld id="{9379C374-18C6-4E53-9ACF-4A8973656D85}" type="datetimeFigureOut">
               <a:rPr lang="de-AT" smtClean="0"/>
-              <a:t>23.06.2022</a:t>
+              <a:t>24.06.2022</a:t>
             </a:fld>
             <a:endParaRPr lang="de-AT"/>
           </a:p>
@@ -4351,7 +4352,7 @@
           <a:p>
             <a:fld id="{9379C374-18C6-4E53-9ACF-4A8973656D85}" type="datetimeFigureOut">
               <a:rPr lang="de-AT" smtClean="0"/>
-              <a:t>23.06.2022</a:t>
+              <a:t>24.06.2022</a:t>
             </a:fld>
             <a:endParaRPr lang="de-AT"/>
           </a:p>
@@ -4469,7 +4470,7 @@
           <a:p>
             <a:fld id="{9379C374-18C6-4E53-9ACF-4A8973656D85}" type="datetimeFigureOut">
               <a:rPr lang="de-AT" smtClean="0"/>
-              <a:t>23.06.2022</a:t>
+              <a:t>24.06.2022</a:t>
             </a:fld>
             <a:endParaRPr lang="de-AT"/>
           </a:p>
@@ -4564,7 +4565,7 @@
           <a:p>
             <a:fld id="{9379C374-18C6-4E53-9ACF-4A8973656D85}" type="datetimeFigureOut">
               <a:rPr lang="de-AT" smtClean="0"/>
-              <a:t>23.06.2022</a:t>
+              <a:t>24.06.2022</a:t>
             </a:fld>
             <a:endParaRPr lang="de-AT"/>
           </a:p>
@@ -4819,7 +4820,7 @@
           <a:p>
             <a:fld id="{9379C374-18C6-4E53-9ACF-4A8973656D85}" type="datetimeFigureOut">
               <a:rPr lang="de-AT" smtClean="0"/>
-              <a:t>23.06.2022</a:t>
+              <a:t>24.06.2022</a:t>
             </a:fld>
             <a:endParaRPr lang="de-AT"/>
           </a:p>
@@ -5119,7 +5120,7 @@
           <a:p>
             <a:fld id="{9379C374-18C6-4E53-9ACF-4A8973656D85}" type="datetimeFigureOut">
               <a:rPr lang="de-AT" smtClean="0"/>
-              <a:t>23.06.2022</a:t>
+              <a:t>24.06.2022</a:t>
             </a:fld>
             <a:endParaRPr lang="de-AT"/>
           </a:p>
@@ -5353,7 +5354,7 @@
           <a:p>
             <a:fld id="{9379C374-18C6-4E53-9ACF-4A8973656D85}" type="datetimeFigureOut">
               <a:rPr lang="de-AT" smtClean="0"/>
-              <a:t>23.06.2022</a:t>
+              <a:t>24.06.2022</a:t>
             </a:fld>
             <a:endParaRPr lang="de-AT"/>
           </a:p>
@@ -6165,6 +6166,156 @@
 </p:sld>
 </file>
 
+<file path=ppt/slides/slide10.xml><?xml version="1.0" encoding="utf-8"?>
+<p:sld xmlns:a="http://schemas.openxmlformats.org/drawingml/2006/main" xmlns:r="http://schemas.openxmlformats.org/officeDocument/2006/relationships" xmlns:p="http://schemas.openxmlformats.org/presentationml/2006/main">
+  <p:cSld>
+    <p:spTree>
+      <p:nvGrpSpPr>
+        <p:cNvPr id="1" name=""/>
+        <p:cNvGrpSpPr/>
+        <p:nvPr/>
+      </p:nvGrpSpPr>
+      <p:grpSpPr>
+        <a:xfrm>
+          <a:off x="0" y="0"/>
+          <a:ext cx="0" cy="0"/>
+          <a:chOff x="0" y="0"/>
+          <a:chExt cx="0" cy="0"/>
+        </a:xfrm>
+      </p:grpSpPr>
+      <p:sp>
+        <p:nvSpPr>
+          <p:cNvPr id="2" name="Titel 1">
+            <a:extLst>
+              <a:ext uri="{FF2B5EF4-FFF2-40B4-BE49-F238E27FC236}">
+                <a16:creationId xmlns:a16="http://schemas.microsoft.com/office/drawing/2014/main" id="{0CE14C8E-DBA3-0D34-290F-045FF0FAB431}"/>
+              </a:ext>
+            </a:extLst>
+          </p:cNvPr>
+          <p:cNvSpPr>
+            <a:spLocks noGrp="1"/>
+          </p:cNvSpPr>
+          <p:nvPr>
+            <p:ph type="ctrTitle"/>
+          </p:nvPr>
+        </p:nvSpPr>
+        <p:spPr/>
+        <p:txBody>
+          <a:bodyPr/>
+          <a:lstStyle/>
+          <a:p>
+            <a:r>
+              <a:rPr lang="de-AT" dirty="0" err="1"/>
+              <a:t>Thanks</a:t>
+            </a:r>
+            <a:r>
+              <a:rPr lang="de-AT" dirty="0"/>
+              <a:t> </a:t>
+            </a:r>
+            <a:r>
+              <a:rPr lang="de-AT" dirty="0" err="1"/>
+              <a:t>for</a:t>
+            </a:r>
+            <a:r>
+              <a:rPr lang="de-AT" dirty="0"/>
+              <a:t> </a:t>
+            </a:r>
+            <a:r>
+              <a:rPr lang="de-AT" dirty="0" err="1"/>
+              <a:t>listening</a:t>
+            </a:r>
+            <a:r>
+              <a:rPr lang="de-AT" dirty="0"/>
+              <a:t>!</a:t>
+            </a:r>
+          </a:p>
+        </p:txBody>
+      </p:sp>
+      <p:sp>
+        <p:nvSpPr>
+          <p:cNvPr id="3" name="Untertitel 2">
+            <a:extLst>
+              <a:ext uri="{FF2B5EF4-FFF2-40B4-BE49-F238E27FC236}">
+                <a16:creationId xmlns:a16="http://schemas.microsoft.com/office/drawing/2014/main" id="{52B10A4C-77AF-36A7-4F14-AF3F54EC7D4C}"/>
+              </a:ext>
+            </a:extLst>
+          </p:cNvPr>
+          <p:cNvSpPr>
+            <a:spLocks noGrp="1"/>
+          </p:cNvSpPr>
+          <p:nvPr>
+            <p:ph type="subTitle" idx="1"/>
+          </p:nvPr>
+        </p:nvSpPr>
+        <p:spPr/>
+        <p:txBody>
+          <a:bodyPr/>
+          <a:lstStyle/>
+          <a:p>
+            <a:r>
+              <a:rPr lang="de-AT" dirty="0" err="1"/>
+              <a:t>Feel</a:t>
+            </a:r>
+            <a:r>
+              <a:rPr lang="de-AT" dirty="0"/>
+              <a:t> </a:t>
+            </a:r>
+            <a:r>
+              <a:rPr lang="de-AT" dirty="0" err="1"/>
+              <a:t>free</a:t>
+            </a:r>
+            <a:r>
+              <a:rPr lang="de-AT" dirty="0"/>
+              <a:t> </a:t>
+            </a:r>
+            <a:r>
+              <a:rPr lang="de-AT" dirty="0" err="1"/>
+              <a:t>to</a:t>
+            </a:r>
+            <a:r>
+              <a:rPr lang="de-AT" dirty="0"/>
+              <a:t> </a:t>
+            </a:r>
+            <a:r>
+              <a:rPr lang="de-AT" dirty="0" err="1"/>
+              <a:t>ask</a:t>
+            </a:r>
+            <a:r>
+              <a:rPr lang="de-AT" dirty="0"/>
+              <a:t> </a:t>
+            </a:r>
+            <a:r>
+              <a:rPr lang="de-AT" dirty="0" err="1"/>
+              <a:t>any</a:t>
+            </a:r>
+            <a:r>
+              <a:rPr lang="de-AT" dirty="0"/>
+              <a:t> </a:t>
+            </a:r>
+            <a:r>
+              <a:rPr lang="de-AT" dirty="0" err="1"/>
+              <a:t>question</a:t>
+            </a:r>
+            <a:r>
+              <a:rPr lang="de-AT" dirty="0"/>
+              <a:t>!</a:t>
+            </a:r>
+          </a:p>
+        </p:txBody>
+      </p:sp>
+    </p:spTree>
+    <p:extLst>
+      <p:ext uri="{BB962C8B-B14F-4D97-AF65-F5344CB8AC3E}">
+        <p14:creationId xmlns:p14="http://schemas.microsoft.com/office/powerpoint/2010/main" val="3760356345"/>
+      </p:ext>
+    </p:extLst>
+  </p:cSld>
+  <p:clrMapOvr>
+    <a:masterClrMapping/>
+  </p:clrMapOvr>
+</p:sld>
+</file>
+
 <file path=ppt/slides/slide2.xml><?xml version="1.0" encoding="utf-8"?>
 <p:sld xmlns:a="http://schemas.openxmlformats.org/drawingml/2006/main" xmlns:r="http://schemas.openxmlformats.org/officeDocument/2006/relationships" xmlns:p="http://schemas.openxmlformats.org/presentationml/2006/main">
   <p:cSld>
@@ -9210,9 +9361,16 @@
             <p:ph type="title"/>
           </p:nvPr>
         </p:nvSpPr>
-        <p:spPr/>
-        <p:txBody>
-          <a:bodyPr/>
+        <p:spPr>
+          <a:xfrm>
+            <a:off x="913795" y="0"/>
+            <a:ext cx="10353762" cy="754428"/>
+          </a:xfrm>
+        </p:spPr>
+        <p:txBody>
+          <a:bodyPr>
+            <a:normAutofit/>
+          </a:bodyPr>
           <a:lstStyle/>
           <a:p>
             <a:r>
@@ -9223,31 +9381,41 @@
           </a:p>
         </p:txBody>
       </p:sp>
-      <p:sp>
-        <p:nvSpPr>
-          <p:cNvPr id="3" name="Inhaltsplatzhalter 2">
+      <p:pic>
+        <p:nvPicPr>
+          <p:cNvPr id="5" name="Inhaltsplatzhalter 4">
             <a:extLst>
               <a:ext uri="{FF2B5EF4-FFF2-40B4-BE49-F238E27FC236}">
-                <a16:creationId xmlns:a16="http://schemas.microsoft.com/office/drawing/2014/main" id="{E94222C2-994F-426B-1A9E-F62640CFA03C}"/>
+                <a16:creationId xmlns:a16="http://schemas.microsoft.com/office/drawing/2014/main" id="{19A7A6C5-F886-20DC-2A9D-A08EF0551C4B}"/>
               </a:ext>
             </a:extLst>
           </p:cNvPr>
-          <p:cNvSpPr>
-            <a:spLocks noGrp="1"/>
-          </p:cNvSpPr>
+          <p:cNvPicPr>
+            <a:picLocks noGrp="1" noChangeAspect="1"/>
+          </p:cNvPicPr>
           <p:nvPr>
             <p:ph idx="1"/>
           </p:nvPr>
-        </p:nvSpPr>
-        <p:spPr/>
-        <p:txBody>
-          <a:bodyPr/>
-          <a:lstStyle/>
-          <a:p>
-            <a:endParaRPr lang="de-AT"/>
-          </a:p>
-        </p:txBody>
-      </p:sp>
+        </p:nvPicPr>
+        <p:blipFill>
+          <a:blip r:embed="rId2">
+            <a:extLst>
+              <a:ext uri="{28A0092B-C50C-407E-A947-70E740481C1C}">
+                <a14:useLocalDpi xmlns:a14="http://schemas.microsoft.com/office/drawing/2010/main" val="0"/>
+              </a:ext>
+            </a:extLst>
+          </a:blip>
+          <a:stretch>
+            <a:fillRect/>
+          </a:stretch>
+        </p:blipFill>
+        <p:spPr>
+          <a:xfrm>
+            <a:off x="1987864" y="754428"/>
+            <a:ext cx="8205624" cy="5851637"/>
+          </a:xfrm>
+        </p:spPr>
+      </p:pic>
     </p:spTree>
     <p:extLst>
       <p:ext uri="{BB962C8B-B14F-4D97-AF65-F5344CB8AC3E}">

</xml_diff>